<commit_message>
Renamed CheckerBoardAlternate to CheckerBoard
Also altered other files to work with the name change
</commit_message>
<xml_diff>
--- a/presentation/EECS 448- Project 3 Presentation.pptx
+++ b/presentation/EECS 448- Project 3 Presentation.pptx
@@ -3621,19 +3621,7 @@
             </a:r>
             <a:r>
               <a:rPr lang="en-US" sz="2800" dirty="0" smtClean="0"/>
-              <a:t>wo-player </a:t>
-            </a:r>
-            <a:r>
-              <a:rPr lang="en-US" sz="2800" dirty="0" smtClean="0"/>
-              <a:t>Checkers </a:t>
-            </a:r>
-            <a:r>
-              <a:rPr lang="en-US" sz="2800" dirty="0" smtClean="0"/>
-              <a:t>game with Server managed games </a:t>
-            </a:r>
-            <a:r>
-              <a:rPr lang="en-US" sz="2800" dirty="0" smtClean="0"/>
-              <a:t>written in Java Swing</a:t>
+              <a:t>wo-player Checkers game with Server managed games written in Java Swing</a:t>
             </a:r>
             <a:br>
               <a:rPr lang="en-US" sz="2800" dirty="0" smtClean="0"/>
@@ -3813,8 +3801,12 @@
           <a:p>
             <a:pPr lvl="1"/>
             <a:r>
+              <a:rPr lang="en-US" sz="3800" smtClean="0"/>
+              <a:t>removal </a:t>
+            </a:r>
+            <a:r>
               <a:rPr lang="en-US" sz="3800" dirty="0" smtClean="0"/>
-              <a:t>removing of pieces</a:t>
+              <a:t>of pieces</a:t>
             </a:r>
             <a:br>
               <a:rPr lang="en-US" sz="3800" dirty="0" smtClean="0"/>
@@ -3833,7 +3825,6 @@
               <a:rPr lang="en-US" sz="3800" dirty="0" smtClean="0"/>
               <a:t>game and server/client interface</a:t>
             </a:r>
-            <a:endParaRPr lang="en-US" sz="3800" dirty="0" smtClean="0"/>
           </a:p>
           <a:p>
             <a:pPr lvl="1"/>
@@ -4046,15 +4037,7 @@
             <a:pPr lvl="1"/>
             <a:r>
               <a:rPr lang="en-US" sz="2400" dirty="0" smtClean="0"/>
-              <a:t>Client/server </a:t>
-            </a:r>
-            <a:r>
-              <a:rPr lang="en-US" sz="2400" dirty="0" smtClean="0"/>
-              <a:t>communication</a:t>
-            </a:r>
-            <a:r>
-              <a:rPr lang="en-US" sz="2400" dirty="0" smtClean="0"/>
-              <a:t/>
+              <a:t>Client/server communication</a:t>
             </a:r>
             <a:br>
               <a:rPr lang="en-US" sz="2400" dirty="0" smtClean="0"/>
@@ -4367,11 +4350,7 @@
           <a:p>
             <a:r>
               <a:rPr lang="en-US" sz="3200" dirty="0" smtClean="0"/>
-              <a:t>being able to redraw the board correctly with each valid </a:t>
-            </a:r>
-            <a:r>
-              <a:rPr lang="en-US" sz="3200" dirty="0" smtClean="0"/>
-              <a:t>movement</a:t>
+              <a:t>being able to redraw the board correctly with each valid movement</a:t>
             </a:r>
           </a:p>
           <a:p>
@@ -4386,7 +4365,6 @@
               <a:rPr lang="en-US" sz="3200" dirty="0" smtClean="0"/>
               <a:t>etermining how to make game compatible with Java networking components</a:t>
             </a:r>
-            <a:endParaRPr lang="en-US" sz="3200" dirty="0" smtClean="0"/>
           </a:p>
           <a:p>
             <a:endParaRPr lang="en-US" sz="3200" dirty="0"/>
@@ -4532,11 +4510,7 @@
           <a:p>
             <a:r>
               <a:rPr lang="en-US" sz="4000" dirty="0" smtClean="0"/>
-              <a:t>Oracle, YouTube and various </a:t>
-            </a:r>
-            <a:r>
-              <a:rPr lang="en-US" sz="4000" dirty="0" smtClean="0"/>
-              <a:t>tutorials</a:t>
+              <a:t>Oracle, YouTube and various tutorials</a:t>
             </a:r>
             <a:endParaRPr lang="en-US" sz="4000" dirty="0"/>
           </a:p>

</xml_diff>